<commit_message>
Review-1 Updated PPT was uploaded
</commit_message>
<xml_diff>
--- a/Review-1 PPT/Batch-A7___review-0[1][1]-2.pptx
+++ b/Review-1 PPT/Batch-A7___review-0[1][1]-2.pptx
@@ -239,7 +239,7 @@
           <a:p>
             <a:fld id="{00860417-10C0-42C4-B528-E5173BFD5C4B}" type="datetimeFigureOut">
               <a:rPr lang="en-IN" smtClean="0"/>
-              <a:t>29-10-2023</a:t>
+              <a:t>30-10-2023</a:t>
             </a:fld>
             <a:endParaRPr lang="en-IN"/>
           </a:p>
@@ -420,7 +420,7 @@
           <a:p>
             <a:fld id="{002CEDD8-EBA5-4B42-8E8B-1E4FD2ACC58E}" type="datetimeFigureOut">
               <a:rPr lang="en-IN" smtClean="0"/>
-              <a:t>29-10-2023</a:t>
+              <a:t>30-10-2023</a:t>
             </a:fld>
             <a:endParaRPr lang="en-IN"/>
           </a:p>
@@ -10677,36 +10677,6 @@
           </a:p>
         </p:txBody>
       </p:sp>
-      <p:pic>
-        <p:nvPicPr>
-          <p:cNvPr id="7" name="Picture 6">
-            <a:extLst>
-              <a:ext uri="{FF2B5EF4-FFF2-40B4-BE49-F238E27FC236}">
-                <a16:creationId xmlns:a16="http://schemas.microsoft.com/office/drawing/2014/main" id="{B165DAFD-FED8-1E36-C47C-AABAA7A28A4D}"/>
-              </a:ext>
-            </a:extLst>
-          </p:cNvPr>
-          <p:cNvPicPr>
-            <a:picLocks noChangeAspect="1"/>
-          </p:cNvPicPr>
-          <p:nvPr/>
-        </p:nvPicPr>
-        <p:blipFill>
-          <a:blip r:embed="rId2"/>
-          <a:stretch>
-            <a:fillRect/>
-          </a:stretch>
-        </p:blipFill>
-        <p:spPr>
-          <a:xfrm>
-            <a:off x="1076959" y="1620158"/>
-            <a:ext cx="10173633" cy="4711194"/>
-          </a:xfrm>
-          <a:prstGeom prst="rect">
-            <a:avLst/>
-          </a:prstGeom>
-        </p:spPr>
-      </p:pic>
       <p:sp>
         <p:nvSpPr>
           <p:cNvPr id="3" name="Rectangle 2">
@@ -10827,6 +10797,36 @@
           </a:p>
         </p:txBody>
       </p:sp>
+      <p:pic>
+        <p:nvPicPr>
+          <p:cNvPr id="9" name="Picture 8">
+            <a:extLst>
+              <a:ext uri="{FF2B5EF4-FFF2-40B4-BE49-F238E27FC236}">
+                <a16:creationId xmlns:a16="http://schemas.microsoft.com/office/drawing/2014/main" id="{F8681BBC-B672-3575-99CF-C0864CD78794}"/>
+              </a:ext>
+            </a:extLst>
+          </p:cNvPr>
+          <p:cNvPicPr>
+            <a:picLocks noChangeAspect="1"/>
+          </p:cNvPicPr>
+          <p:nvPr/>
+        </p:nvPicPr>
+        <p:blipFill>
+          <a:blip r:embed="rId2"/>
+          <a:stretch>
+            <a:fillRect/>
+          </a:stretch>
+        </p:blipFill>
+        <p:spPr>
+          <a:xfrm>
+            <a:off x="497711" y="1169042"/>
+            <a:ext cx="10972800" cy="5243333"/>
+          </a:xfrm>
+          <a:prstGeom prst="rect">
+            <a:avLst/>
+          </a:prstGeom>
+        </p:spPr>
+      </p:pic>
     </p:spTree>
   </p:cSld>
   <p:clrMapOvr>

</xml_diff>